<commit_message>
Add placeholder matching documentation and update default template
- Add comprehensive PlaceholderMatching.md documentation covering placeholder detection, replacement, and formatting
- Updated default.pptx template with latest changes

🤖 Generated with [Claude Code](https://claude.ai/code)

Co-Authored-By: Claude <noreply@anthropic.com>
</commit_message>
<xml_diff>
--- a/src/default.pptx
+++ b/src/default.pptx
@@ -740,7 +740,7 @@
 
 <file path=ppt/slideLayouts/slideLayout12.xml><?xml version="1.0" encoding="utf-8"?>
 <p:sldLayout xmlns:a="http://schemas.openxmlformats.org/drawingml/2006/main" xmlns:r="http://schemas.openxmlformats.org/officeDocument/2006/relationships" xmlns:p="http://schemas.openxmlformats.org/presentationml/2006/main" preserve="1" userDrawn="1">
-  <p:cSld name="Three-columns">
+  <p:cSld name="Four Columns">
     <p:spTree>
       <p:nvGrpSpPr>
         <p:cNvPr id="1" name=""/>
@@ -777,7 +777,7 @@
           <a:lstStyle/>
           <a:p>
             <a:r>
-              <a:rPr lang="en-US"/>
+              <a:rPr lang="en-AU" dirty="0"/>
               <a:t>Click to edit Master title style</a:t>
             </a:r>
           </a:p>
@@ -805,10 +805,10 @@
           <a:lstStyle/>
           <a:p>
             <a:fld id="{EC529286-92C0-9541-AD8C-01D6C4AD1D19}" type="datetimeFigureOut">
-              <a:rPr lang="en-US" smtClean="0"/>
+              <a:rPr lang="en-AU" smtClean="0"/>
               <a:t>6/19/25</a:t>
             </a:fld>
-            <a:endParaRPr lang="en-US"/>
+            <a:endParaRPr lang="en-AU" dirty="0"/>
           </a:p>
         </p:txBody>
       </p:sp>
@@ -833,7 +833,7 @@
           <a:bodyPr/>
           <a:lstStyle/>
           <a:p>
-            <a:endParaRPr lang="en-US"/>
+            <a:endParaRPr lang="en-AU" dirty="0"/>
           </a:p>
         </p:txBody>
       </p:sp>
@@ -859,16 +859,16 @@
           <a:lstStyle/>
           <a:p>
             <a:fld id="{A143B96B-A9D1-B043-A895-7058C808B531}" type="slidenum">
-              <a:rPr lang="en-US" smtClean="0"/>
+              <a:rPr lang="en-AU" smtClean="0"/>
               <a:t>‹#›</a:t>
             </a:fld>
-            <a:endParaRPr lang="en-US"/>
-          </a:p>
-        </p:txBody>
-      </p:sp>
-      <p:sp>
-        <p:nvSpPr>
-          <p:cNvPr id="15" name="Text Placeholder 14">
+            <a:endParaRPr lang="en-AU" dirty="0"/>
+          </a:p>
+        </p:txBody>
+      </p:sp>
+      <p:sp>
+        <p:nvSpPr>
+          <p:cNvPr id="15" name="col_1_title">
             <a:extLst>
               <a:ext uri="{FF2B5EF4-FFF2-40B4-BE49-F238E27FC236}">
                 <a16:creationId xmlns:a16="http://schemas.microsoft.com/office/drawing/2014/main" id="{C5582F3A-D943-D22B-50C2-39C5D4F802ED}"/>
@@ -901,15 +901,15 @@
           <a:p>
             <a:pPr lvl="0"/>
             <a:r>
-              <a:rPr lang="en-US" dirty="0"/>
-              <a:t>col_1_title_placeholder</a:t>
-            </a:r>
-          </a:p>
-        </p:txBody>
-      </p:sp>
-      <p:sp>
-        <p:nvSpPr>
-          <p:cNvPr id="16" name="Text Placeholder 14">
+              <a:rPr lang="en-AU" dirty="0"/>
+              <a:t>col_1_title</a:t>
+            </a:r>
+          </a:p>
+        </p:txBody>
+      </p:sp>
+      <p:sp>
+        <p:nvSpPr>
+          <p:cNvPr id="16" name="col_1_content">
             <a:extLst>
               <a:ext uri="{FF2B5EF4-FFF2-40B4-BE49-F238E27FC236}">
                 <a16:creationId xmlns:a16="http://schemas.microsoft.com/office/drawing/2014/main" id="{9A8DBF07-BA14-1071-232B-F98DD4E14219}"/>
@@ -943,14 +943,14 @@
             <a:pPr lvl="0"/>
             <a:r>
               <a:rPr lang="en-AU" noProof="0" dirty="0"/>
-              <a:t>col_1_content_placeholder</a:t>
-            </a:r>
-          </a:p>
-        </p:txBody>
-      </p:sp>
-      <p:sp>
-        <p:nvSpPr>
-          <p:cNvPr id="17" name="Text Placeholder 14">
+              <a:t>col_1_content</a:t>
+            </a:r>
+          </a:p>
+        </p:txBody>
+      </p:sp>
+      <p:sp>
+        <p:nvSpPr>
+          <p:cNvPr id="17" name="col_2_title">
             <a:extLst>
               <a:ext uri="{FF2B5EF4-FFF2-40B4-BE49-F238E27FC236}">
                 <a16:creationId xmlns:a16="http://schemas.microsoft.com/office/drawing/2014/main" id="{C68EEECF-A9A2-01FF-29D1-8860960C11F2}"/>
@@ -983,7 +983,7 @@
           <a:p>
             <a:pPr lvl="0"/>
             <a:r>
-              <a:rPr lang="en-US" dirty="0"/>
+              <a:rPr lang="en-AU" dirty="0"/>
               <a:t>col_2_title_placeholder</a:t>
             </a:r>
           </a:p>
@@ -991,7 +991,7 @@
       </p:sp>
       <p:sp>
         <p:nvSpPr>
-          <p:cNvPr id="18" name="Text Placeholder 14">
+          <p:cNvPr id="18" name="col_2_content">
             <a:extLst>
               <a:ext uri="{FF2B5EF4-FFF2-40B4-BE49-F238E27FC236}">
                 <a16:creationId xmlns:a16="http://schemas.microsoft.com/office/drawing/2014/main" id="{3243E739-7F7F-7D90-BE91-2AD0ED2AACF7}"/>
@@ -1032,7 +1032,7 @@
       </p:sp>
       <p:sp>
         <p:nvSpPr>
-          <p:cNvPr id="19" name="Text Placeholder 14">
+          <p:cNvPr id="19" name="col_3_title">
             <a:extLst>
               <a:ext uri="{FF2B5EF4-FFF2-40B4-BE49-F238E27FC236}">
                 <a16:creationId xmlns:a16="http://schemas.microsoft.com/office/drawing/2014/main" id="{D573766F-5004-93C6-42A6-7E3631D73094}"/>
@@ -1065,7 +1065,7 @@
           <a:p>
             <a:pPr lvl="0"/>
             <a:r>
-              <a:rPr lang="en-US" dirty="0"/>
+              <a:rPr lang="en-AU" dirty="0"/>
               <a:t>col_3_title_placeholder</a:t>
             </a:r>
           </a:p>
@@ -1073,7 +1073,7 @@
       </p:sp>
       <p:sp>
         <p:nvSpPr>
-          <p:cNvPr id="20" name="Text Placeholder 14">
+          <p:cNvPr id="20" name="col_3_content">
             <a:extLst>
               <a:ext uri="{FF2B5EF4-FFF2-40B4-BE49-F238E27FC236}">
                 <a16:creationId xmlns:a16="http://schemas.microsoft.com/office/drawing/2014/main" id="{46D4B212-27B2-3CDE-4333-250AB6ED6943}"/>
@@ -1114,7 +1114,7 @@
       </p:sp>
       <p:sp>
         <p:nvSpPr>
-          <p:cNvPr id="21" name="Text Placeholder 14">
+          <p:cNvPr id="21" name="col_4_title">
             <a:extLst>
               <a:ext uri="{FF2B5EF4-FFF2-40B4-BE49-F238E27FC236}">
                 <a16:creationId xmlns:a16="http://schemas.microsoft.com/office/drawing/2014/main" id="{F12D07A2-F21E-7459-600E-C4B7BD11CD64}"/>
@@ -1147,7 +1147,7 @@
           <a:p>
             <a:pPr lvl="0"/>
             <a:r>
-              <a:rPr lang="en-US" dirty="0"/>
+              <a:rPr lang="en-AU" dirty="0"/>
               <a:t>col_4_title_placeholder</a:t>
             </a:r>
           </a:p>
@@ -1155,7 +1155,7 @@
       </p:sp>
       <p:sp>
         <p:nvSpPr>
-          <p:cNvPr id="22" name="Text Placeholder 14">
+          <p:cNvPr id="22" name="col_4_content">
             <a:extLst>
               <a:ext uri="{FF2B5EF4-FFF2-40B4-BE49-F238E27FC236}">
                 <a16:creationId xmlns:a16="http://schemas.microsoft.com/office/drawing/2014/main" id="{C35A8091-5AA2-245D-989D-83E80FA1E6B3}"/>

</xml_diff>

<commit_message>
Updated templates and json test
</commit_message>
<xml_diff>
--- a/src/default.pptx
+++ b/src/default.pptx
@@ -259,7 +259,7 @@
           <a:p>
             <a:fld id="{EC529286-92C0-9541-AD8C-01D6C4AD1D19}" type="datetimeFigureOut">
               <a:rPr lang="en-US" smtClean="0"/>
-              <a:t>6/19/25</a:t>
+              <a:t>6/20/25</a:t>
             </a:fld>
             <a:endParaRPr lang="en-US"/>
           </a:p>
@@ -457,7 +457,7 @@
           <a:p>
             <a:fld id="{EC529286-92C0-9541-AD8C-01D6C4AD1D19}" type="datetimeFigureOut">
               <a:rPr lang="en-US" smtClean="0"/>
-              <a:t>6/19/25</a:t>
+              <a:t>6/20/25</a:t>
             </a:fld>
             <a:endParaRPr lang="en-US"/>
           </a:p>
@@ -665,7 +665,7 @@
           <a:p>
             <a:fld id="{EC529286-92C0-9541-AD8C-01D6C4AD1D19}" type="datetimeFigureOut">
               <a:rPr lang="en-US" smtClean="0"/>
-              <a:t>6/19/25</a:t>
+              <a:t>6/20/25</a:t>
             </a:fld>
             <a:endParaRPr lang="en-US"/>
           </a:p>
@@ -785,90 +785,7 @@
       </p:sp>
       <p:sp>
         <p:nvSpPr>
-          <p:cNvPr id="3" name="Date Placeholder 2">
-            <a:extLst>
-              <a:ext uri="{FF2B5EF4-FFF2-40B4-BE49-F238E27FC236}">
-                <a16:creationId xmlns:a16="http://schemas.microsoft.com/office/drawing/2014/main" id="{0C5DD35D-1952-C99B-E166-7B080AC7AFB5}"/>
-              </a:ext>
-            </a:extLst>
-          </p:cNvPr>
-          <p:cNvSpPr>
-            <a:spLocks noGrp="1"/>
-          </p:cNvSpPr>
-          <p:nvPr>
-            <p:ph type="dt" sz="half" idx="10"/>
-          </p:nvPr>
-        </p:nvSpPr>
-        <p:spPr/>
-        <p:txBody>
-          <a:bodyPr/>
-          <a:lstStyle/>
-          <a:p>
-            <a:fld id="{EC529286-92C0-9541-AD8C-01D6C4AD1D19}" type="datetimeFigureOut">
-              <a:rPr lang="en-AU" smtClean="0"/>
-              <a:t>6/19/25</a:t>
-            </a:fld>
-            <a:endParaRPr lang="en-AU" dirty="0"/>
-          </a:p>
-        </p:txBody>
-      </p:sp>
-      <p:sp>
-        <p:nvSpPr>
-          <p:cNvPr id="4" name="Footer Placeholder 3">
-            <a:extLst>
-              <a:ext uri="{FF2B5EF4-FFF2-40B4-BE49-F238E27FC236}">
-                <a16:creationId xmlns:a16="http://schemas.microsoft.com/office/drawing/2014/main" id="{06FE9D83-1B1B-0E92-559C-E83F0EE298A4}"/>
-              </a:ext>
-            </a:extLst>
-          </p:cNvPr>
-          <p:cNvSpPr>
-            <a:spLocks noGrp="1"/>
-          </p:cNvSpPr>
-          <p:nvPr>
-            <p:ph type="ftr" sz="quarter" idx="11"/>
-          </p:nvPr>
-        </p:nvSpPr>
-        <p:spPr/>
-        <p:txBody>
-          <a:bodyPr/>
-          <a:lstStyle/>
-          <a:p>
-            <a:endParaRPr lang="en-AU" dirty="0"/>
-          </a:p>
-        </p:txBody>
-      </p:sp>
-      <p:sp>
-        <p:nvSpPr>
-          <p:cNvPr id="5" name="Slide Number Placeholder 4">
-            <a:extLst>
-              <a:ext uri="{FF2B5EF4-FFF2-40B4-BE49-F238E27FC236}">
-                <a16:creationId xmlns:a16="http://schemas.microsoft.com/office/drawing/2014/main" id="{FA093232-03CE-D3D4-9EED-ECB2BD712A7E}"/>
-              </a:ext>
-            </a:extLst>
-          </p:cNvPr>
-          <p:cNvSpPr>
-            <a:spLocks noGrp="1"/>
-          </p:cNvSpPr>
-          <p:nvPr>
-            <p:ph type="sldNum" sz="quarter" idx="12"/>
-          </p:nvPr>
-        </p:nvSpPr>
-        <p:spPr/>
-        <p:txBody>
-          <a:bodyPr/>
-          <a:lstStyle/>
-          <a:p>
-            <a:fld id="{A143B96B-A9D1-B043-A895-7058C808B531}" type="slidenum">
-              <a:rPr lang="en-AU" smtClean="0"/>
-              <a:t>‹#›</a:t>
-            </a:fld>
-            <a:endParaRPr lang="en-AU" dirty="0"/>
-          </a:p>
-        </p:txBody>
-      </p:sp>
-      <p:sp>
-        <p:nvSpPr>
-          <p:cNvPr id="15" name="col_1_title">
+          <p:cNvPr id="15" name="Col 1 Title Placeholder 2">
             <a:extLst>
               <a:ext uri="{FF2B5EF4-FFF2-40B4-BE49-F238E27FC236}">
                 <a16:creationId xmlns:a16="http://schemas.microsoft.com/office/drawing/2014/main" id="{C5582F3A-D943-D22B-50C2-39C5D4F802ED}"/>
@@ -879,7 +796,7 @@
             <a:spLocks noGrp="1"/>
           </p:cNvSpPr>
           <p:nvPr>
-            <p:ph type="body" sz="quarter" idx="13" hasCustomPrompt="1"/>
+            <p:ph type="body" sz="quarter" idx="13"/>
           </p:nvPr>
         </p:nvSpPr>
         <p:spPr>
@@ -900,16 +817,13 @@
           </a:lstStyle>
           <a:p>
             <a:pPr lvl="0"/>
-            <a:r>
-              <a:rPr lang="en-AU" dirty="0"/>
-              <a:t>col_1_title</a:t>
-            </a:r>
-          </a:p>
-        </p:txBody>
-      </p:sp>
-      <p:sp>
-        <p:nvSpPr>
-          <p:cNvPr id="16" name="col_1_content">
+            <a:endParaRPr lang="en-AU" dirty="0"/>
+          </a:p>
+        </p:txBody>
+      </p:sp>
+      <p:sp>
+        <p:nvSpPr>
+          <p:cNvPr id="16" name="Col 1 Text Placeholder 3">
             <a:extLst>
               <a:ext uri="{FF2B5EF4-FFF2-40B4-BE49-F238E27FC236}">
                 <a16:creationId xmlns:a16="http://schemas.microsoft.com/office/drawing/2014/main" id="{9A8DBF07-BA14-1071-232B-F98DD4E14219}"/>
@@ -920,7 +834,7 @@
             <a:spLocks noGrp="1"/>
           </p:cNvSpPr>
           <p:nvPr>
-            <p:ph type="body" sz="quarter" idx="14" hasCustomPrompt="1"/>
+            <p:ph type="body" sz="quarter" idx="14"/>
           </p:nvPr>
         </p:nvSpPr>
         <p:spPr>
@@ -941,16 +855,13 @@
           </a:lstStyle>
           <a:p>
             <a:pPr lvl="0"/>
-            <a:r>
-              <a:rPr lang="en-AU" noProof="0" dirty="0"/>
-              <a:t>col_1_content</a:t>
-            </a:r>
-          </a:p>
-        </p:txBody>
-      </p:sp>
-      <p:sp>
-        <p:nvSpPr>
-          <p:cNvPr id="17" name="col_2_title">
+            <a:endParaRPr lang="en-AU" noProof="0" dirty="0"/>
+          </a:p>
+        </p:txBody>
+      </p:sp>
+      <p:sp>
+        <p:nvSpPr>
+          <p:cNvPr id="17" name="Col 2 Title Placeholder 4">
             <a:extLst>
               <a:ext uri="{FF2B5EF4-FFF2-40B4-BE49-F238E27FC236}">
                 <a16:creationId xmlns:a16="http://schemas.microsoft.com/office/drawing/2014/main" id="{C68EEECF-A9A2-01FF-29D1-8860960C11F2}"/>
@@ -961,7 +872,7 @@
             <a:spLocks noGrp="1"/>
           </p:cNvSpPr>
           <p:nvPr>
-            <p:ph type="body" sz="quarter" idx="15" hasCustomPrompt="1"/>
+            <p:ph type="body" sz="quarter" idx="15"/>
           </p:nvPr>
         </p:nvSpPr>
         <p:spPr>
@@ -982,16 +893,13 @@
           </a:lstStyle>
           <a:p>
             <a:pPr lvl="0"/>
-            <a:r>
-              <a:rPr lang="en-AU" dirty="0"/>
-              <a:t>col_2_title_placeholder</a:t>
-            </a:r>
-          </a:p>
-        </p:txBody>
-      </p:sp>
-      <p:sp>
-        <p:nvSpPr>
-          <p:cNvPr id="18" name="col_2_content">
+            <a:endParaRPr lang="en-AU" dirty="0"/>
+          </a:p>
+        </p:txBody>
+      </p:sp>
+      <p:sp>
+        <p:nvSpPr>
+          <p:cNvPr id="18" name="Col 1 Text Placeholder 5">
             <a:extLst>
               <a:ext uri="{FF2B5EF4-FFF2-40B4-BE49-F238E27FC236}">
                 <a16:creationId xmlns:a16="http://schemas.microsoft.com/office/drawing/2014/main" id="{3243E739-7F7F-7D90-BE91-2AD0ED2AACF7}"/>
@@ -1002,7 +910,7 @@
             <a:spLocks noGrp="1"/>
           </p:cNvSpPr>
           <p:nvPr>
-            <p:ph type="body" sz="quarter" idx="16" hasCustomPrompt="1"/>
+            <p:ph type="body" sz="quarter" idx="16"/>
           </p:nvPr>
         </p:nvSpPr>
         <p:spPr>
@@ -1023,16 +931,13 @@
           </a:lstStyle>
           <a:p>
             <a:pPr lvl="0"/>
-            <a:r>
-              <a:rPr lang="en-AU" noProof="0" dirty="0"/>
-              <a:t>col_2_content_placeholder</a:t>
-            </a:r>
-          </a:p>
-        </p:txBody>
-      </p:sp>
-      <p:sp>
-        <p:nvSpPr>
-          <p:cNvPr id="19" name="col_3_title">
+            <a:endParaRPr lang="en-AU" noProof="0" dirty="0"/>
+          </a:p>
+        </p:txBody>
+      </p:sp>
+      <p:sp>
+        <p:nvSpPr>
+          <p:cNvPr id="19" name="Col 3 Title Placeholder 6">
             <a:extLst>
               <a:ext uri="{FF2B5EF4-FFF2-40B4-BE49-F238E27FC236}">
                 <a16:creationId xmlns:a16="http://schemas.microsoft.com/office/drawing/2014/main" id="{D573766F-5004-93C6-42A6-7E3631D73094}"/>
@@ -1043,7 +948,7 @@
             <a:spLocks noGrp="1"/>
           </p:cNvSpPr>
           <p:nvPr>
-            <p:ph type="body" sz="quarter" idx="17" hasCustomPrompt="1"/>
+            <p:ph type="body" sz="quarter" idx="17"/>
           </p:nvPr>
         </p:nvSpPr>
         <p:spPr>
@@ -1064,16 +969,13 @@
           </a:lstStyle>
           <a:p>
             <a:pPr lvl="0"/>
-            <a:r>
-              <a:rPr lang="en-AU" dirty="0"/>
-              <a:t>col_3_title_placeholder</a:t>
-            </a:r>
-          </a:p>
-        </p:txBody>
-      </p:sp>
-      <p:sp>
-        <p:nvSpPr>
-          <p:cNvPr id="20" name="col_3_content">
+            <a:endParaRPr lang="en-AU" dirty="0"/>
+          </a:p>
+        </p:txBody>
+      </p:sp>
+      <p:sp>
+        <p:nvSpPr>
+          <p:cNvPr id="20" name="Col 1 Text Placeholder 7">
             <a:extLst>
               <a:ext uri="{FF2B5EF4-FFF2-40B4-BE49-F238E27FC236}">
                 <a16:creationId xmlns:a16="http://schemas.microsoft.com/office/drawing/2014/main" id="{46D4B212-27B2-3CDE-4333-250AB6ED6943}"/>
@@ -1084,7 +986,7 @@
             <a:spLocks noGrp="1"/>
           </p:cNvSpPr>
           <p:nvPr>
-            <p:ph type="body" sz="quarter" idx="18" hasCustomPrompt="1"/>
+            <p:ph type="body" sz="quarter" idx="18"/>
           </p:nvPr>
         </p:nvSpPr>
         <p:spPr>
@@ -1105,16 +1007,13 @@
           </a:lstStyle>
           <a:p>
             <a:pPr lvl="0"/>
-            <a:r>
-              <a:rPr lang="en-AU" noProof="0" dirty="0"/>
-              <a:t>col_3_content_placeholder</a:t>
-            </a:r>
-          </a:p>
-        </p:txBody>
-      </p:sp>
-      <p:sp>
-        <p:nvSpPr>
-          <p:cNvPr id="21" name="col_4_title">
+            <a:endParaRPr lang="en-AU" noProof="0" dirty="0"/>
+          </a:p>
+        </p:txBody>
+      </p:sp>
+      <p:sp>
+        <p:nvSpPr>
+          <p:cNvPr id="21" name="Col 4 Title Placeholder 8">
             <a:extLst>
               <a:ext uri="{FF2B5EF4-FFF2-40B4-BE49-F238E27FC236}">
                 <a16:creationId xmlns:a16="http://schemas.microsoft.com/office/drawing/2014/main" id="{F12D07A2-F21E-7459-600E-C4B7BD11CD64}"/>
@@ -1125,7 +1024,7 @@
             <a:spLocks noGrp="1"/>
           </p:cNvSpPr>
           <p:nvPr>
-            <p:ph type="body" sz="quarter" idx="19" hasCustomPrompt="1"/>
+            <p:ph type="body" sz="quarter" idx="19"/>
           </p:nvPr>
         </p:nvSpPr>
         <p:spPr>
@@ -1146,16 +1045,13 @@
           </a:lstStyle>
           <a:p>
             <a:pPr lvl="0"/>
-            <a:r>
-              <a:rPr lang="en-AU" dirty="0"/>
-              <a:t>col_4_title_placeholder</a:t>
-            </a:r>
-          </a:p>
-        </p:txBody>
-      </p:sp>
-      <p:sp>
-        <p:nvSpPr>
-          <p:cNvPr id="22" name="col_4_content">
+            <a:endParaRPr lang="en-AU" dirty="0"/>
+          </a:p>
+        </p:txBody>
+      </p:sp>
+      <p:sp>
+        <p:nvSpPr>
+          <p:cNvPr id="22" name="Col 1 Text Placeholder 9">
             <a:extLst>
               <a:ext uri="{FF2B5EF4-FFF2-40B4-BE49-F238E27FC236}">
                 <a16:creationId xmlns:a16="http://schemas.microsoft.com/office/drawing/2014/main" id="{C35A8091-5AA2-245D-989D-83E80FA1E6B3}"/>
@@ -1166,7 +1062,7 @@
             <a:spLocks noGrp="1"/>
           </p:cNvSpPr>
           <p:nvPr>
-            <p:ph type="body" sz="quarter" idx="20" hasCustomPrompt="1"/>
+            <p:ph type="body" sz="quarter" idx="20"/>
           </p:nvPr>
         </p:nvSpPr>
         <p:spPr>
@@ -1187,10 +1083,90 @@
           </a:lstStyle>
           <a:p>
             <a:pPr lvl="0"/>
-            <a:r>
-              <a:rPr lang="en-AU" noProof="0" dirty="0"/>
-              <a:t>col_4_content_placeholder</a:t>
-            </a:r>
+            <a:endParaRPr lang="en-AU" noProof="0" dirty="0"/>
+          </a:p>
+        </p:txBody>
+      </p:sp>
+      <p:sp>
+        <p:nvSpPr>
+          <p:cNvPr id="3" name="Date Placeholder 10">
+            <a:extLst>
+              <a:ext uri="{FF2B5EF4-FFF2-40B4-BE49-F238E27FC236}">
+                <a16:creationId xmlns:a16="http://schemas.microsoft.com/office/drawing/2014/main" id="{0C5DD35D-1952-C99B-E166-7B080AC7AFB5}"/>
+              </a:ext>
+            </a:extLst>
+          </p:cNvPr>
+          <p:cNvSpPr>
+            <a:spLocks noGrp="1"/>
+          </p:cNvSpPr>
+          <p:nvPr>
+            <p:ph type="dt" sz="half" idx="10"/>
+          </p:nvPr>
+        </p:nvSpPr>
+        <p:spPr/>
+        <p:txBody>
+          <a:bodyPr/>
+          <a:lstStyle/>
+          <a:p>
+            <a:fld id="{EC529286-92C0-9541-AD8C-01D6C4AD1D19}" type="datetimeFigureOut">
+              <a:rPr lang="en-AU" smtClean="0"/>
+              <a:t>20/6/2025</a:t>
+            </a:fld>
+            <a:endParaRPr lang="en-AU" dirty="0"/>
+          </a:p>
+        </p:txBody>
+      </p:sp>
+      <p:sp>
+        <p:nvSpPr>
+          <p:cNvPr id="4" name="Footer Placeholder 11">
+            <a:extLst>
+              <a:ext uri="{FF2B5EF4-FFF2-40B4-BE49-F238E27FC236}">
+                <a16:creationId xmlns:a16="http://schemas.microsoft.com/office/drawing/2014/main" id="{06FE9D83-1B1B-0E92-559C-E83F0EE298A4}"/>
+              </a:ext>
+            </a:extLst>
+          </p:cNvPr>
+          <p:cNvSpPr>
+            <a:spLocks noGrp="1"/>
+          </p:cNvSpPr>
+          <p:nvPr>
+            <p:ph type="ftr" sz="quarter" idx="11"/>
+          </p:nvPr>
+        </p:nvSpPr>
+        <p:spPr/>
+        <p:txBody>
+          <a:bodyPr/>
+          <a:lstStyle/>
+          <a:p>
+            <a:endParaRPr lang="en-AU" dirty="0"/>
+          </a:p>
+        </p:txBody>
+      </p:sp>
+      <p:sp>
+        <p:nvSpPr>
+          <p:cNvPr id="5" name="Slide Number Placeholder 12">
+            <a:extLst>
+              <a:ext uri="{FF2B5EF4-FFF2-40B4-BE49-F238E27FC236}">
+                <a16:creationId xmlns:a16="http://schemas.microsoft.com/office/drawing/2014/main" id="{FA093232-03CE-D3D4-9EED-ECB2BD712A7E}"/>
+              </a:ext>
+            </a:extLst>
+          </p:cNvPr>
+          <p:cNvSpPr>
+            <a:spLocks noGrp="1"/>
+          </p:cNvSpPr>
+          <p:nvPr>
+            <p:ph type="sldNum" sz="quarter" idx="12"/>
+          </p:nvPr>
+        </p:nvSpPr>
+        <p:spPr/>
+        <p:txBody>
+          <a:bodyPr/>
+          <a:lstStyle/>
+          <a:p>
+            <a:fld id="{A143B96B-A9D1-B043-A895-7058C808B531}" type="slidenum">
+              <a:rPr lang="en-AU" smtClean="0"/>
+              <a:t>‹#›</a:t>
+            </a:fld>
+            <a:endParaRPr lang="en-AU" dirty="0"/>
           </a:p>
         </p:txBody>
       </p:sp>
@@ -1332,7 +1308,7 @@
           <a:p>
             <a:fld id="{EC529286-92C0-9541-AD8C-01D6C4AD1D19}" type="datetimeFigureOut">
               <a:rPr lang="en-US" smtClean="0"/>
-              <a:t>6/19/25</a:t>
+              <a:t>6/20/25</a:t>
             </a:fld>
             <a:endParaRPr lang="en-US"/>
           </a:p>
@@ -1607,7 +1583,7 @@
           <a:p>
             <a:fld id="{EC529286-92C0-9541-AD8C-01D6C4AD1D19}" type="datetimeFigureOut">
               <a:rPr lang="en-US" smtClean="0"/>
-              <a:t>6/19/25</a:t>
+              <a:t>6/20/25</a:t>
             </a:fld>
             <a:endParaRPr lang="en-US"/>
           </a:p>
@@ -1872,7 +1848,7 @@
           <a:p>
             <a:fld id="{EC529286-92C0-9541-AD8C-01D6C4AD1D19}" type="datetimeFigureOut">
               <a:rPr lang="en-US" smtClean="0"/>
-              <a:t>6/19/25</a:t>
+              <a:t>6/20/25</a:t>
             </a:fld>
             <a:endParaRPr lang="en-US"/>
           </a:p>
@@ -2284,7 +2260,7 @@
           <a:p>
             <a:fld id="{EC529286-92C0-9541-AD8C-01D6C4AD1D19}" type="datetimeFigureOut">
               <a:rPr lang="en-US" smtClean="0"/>
-              <a:t>6/19/25</a:t>
+              <a:t>6/20/25</a:t>
             </a:fld>
             <a:endParaRPr lang="en-US"/>
           </a:p>
@@ -2425,7 +2401,7 @@
           <a:p>
             <a:fld id="{EC529286-92C0-9541-AD8C-01D6C4AD1D19}" type="datetimeFigureOut">
               <a:rPr lang="en-US" smtClean="0"/>
-              <a:t>6/19/25</a:t>
+              <a:t>6/20/25</a:t>
             </a:fld>
             <a:endParaRPr lang="en-US"/>
           </a:p>
@@ -2538,7 +2514,7 @@
           <a:p>
             <a:fld id="{EC529286-92C0-9541-AD8C-01D6C4AD1D19}" type="datetimeFigureOut">
               <a:rPr lang="en-US" smtClean="0"/>
-              <a:t>6/19/25</a:t>
+              <a:t>6/20/25</a:t>
             </a:fld>
             <a:endParaRPr lang="en-US"/>
           </a:p>
@@ -2849,7 +2825,7 @@
           <a:p>
             <a:fld id="{EC529286-92C0-9541-AD8C-01D6C4AD1D19}" type="datetimeFigureOut">
               <a:rPr lang="en-US" smtClean="0"/>
-              <a:t>6/19/25</a:t>
+              <a:t>6/20/25</a:t>
             </a:fld>
             <a:endParaRPr lang="en-US"/>
           </a:p>
@@ -3137,7 +3113,7 @@
           <a:p>
             <a:fld id="{EC529286-92C0-9541-AD8C-01D6C4AD1D19}" type="datetimeFigureOut">
               <a:rPr lang="en-US" smtClean="0"/>
-              <a:t>6/19/25</a:t>
+              <a:t>6/20/25</a:t>
             </a:fld>
             <a:endParaRPr lang="en-US"/>
           </a:p>
@@ -3378,7 +3354,7 @@
           <a:p>
             <a:fld id="{EC529286-92C0-9541-AD8C-01D6C4AD1D19}" type="datetimeFigureOut">
               <a:rPr lang="en-US" smtClean="0"/>
-              <a:t>6/19/25</a:t>
+              <a:t>6/20/25</a:t>
             </a:fld>
             <a:endParaRPr lang="en-US"/>
           </a:p>

</xml_diff>